<commit_message>
adding mcp examples and slides
</commit_message>
<xml_diff>
--- a/Slides/EBGN645_Day16.pptx
+++ b/Slides/EBGN645_Day16.pptx
@@ -228,7 +228,7 @@
           <a:p>
             <a:fld id="{30788CEC-4D82-3F47-91BB-0B78145C2C25}" type="datetimeFigureOut">
               <a:rPr lang="en-US" smtClean="0"/>
-              <a:t>10/16/24</a:t>
+              <a:t>10/25/24</a:t>
             </a:fld>
             <a:endParaRPr lang="en-US"/>
           </a:p>
@@ -1035,7 +1035,7 @@
           <a:p>
             <a:fld id="{6D1BDCCC-1CBB-FA4E-9CF2-2901E22410E7}" type="datetimeFigureOut">
               <a:rPr lang="en-US" smtClean="0"/>
-              <a:t>10/16/24</a:t>
+              <a:t>10/25/24</a:t>
             </a:fld>
             <a:endParaRPr lang="en-US"/>
           </a:p>
@@ -1233,7 +1233,7 @@
           <a:p>
             <a:fld id="{6D1BDCCC-1CBB-FA4E-9CF2-2901E22410E7}" type="datetimeFigureOut">
               <a:rPr lang="en-US" smtClean="0"/>
-              <a:t>10/16/24</a:t>
+              <a:t>10/25/24</a:t>
             </a:fld>
             <a:endParaRPr lang="en-US"/>
           </a:p>
@@ -1441,7 +1441,7 @@
           <a:p>
             <a:fld id="{6D1BDCCC-1CBB-FA4E-9CF2-2901E22410E7}" type="datetimeFigureOut">
               <a:rPr lang="en-US" smtClean="0"/>
-              <a:t>10/16/24</a:t>
+              <a:t>10/25/24</a:t>
             </a:fld>
             <a:endParaRPr lang="en-US"/>
           </a:p>
@@ -1639,7 +1639,7 @@
           <a:p>
             <a:fld id="{6D1BDCCC-1CBB-FA4E-9CF2-2901E22410E7}" type="datetimeFigureOut">
               <a:rPr lang="en-US" smtClean="0"/>
-              <a:t>10/16/24</a:t>
+              <a:t>10/25/24</a:t>
             </a:fld>
             <a:endParaRPr lang="en-US"/>
           </a:p>
@@ -1914,7 +1914,7 @@
           <a:p>
             <a:fld id="{6D1BDCCC-1CBB-FA4E-9CF2-2901E22410E7}" type="datetimeFigureOut">
               <a:rPr lang="en-US" smtClean="0"/>
-              <a:t>10/16/24</a:t>
+              <a:t>10/25/24</a:t>
             </a:fld>
             <a:endParaRPr lang="en-US"/>
           </a:p>
@@ -2179,7 +2179,7 @@
           <a:p>
             <a:fld id="{6D1BDCCC-1CBB-FA4E-9CF2-2901E22410E7}" type="datetimeFigureOut">
               <a:rPr lang="en-US" smtClean="0"/>
-              <a:t>10/16/24</a:t>
+              <a:t>10/25/24</a:t>
             </a:fld>
             <a:endParaRPr lang="en-US"/>
           </a:p>
@@ -2591,7 +2591,7 @@
           <a:p>
             <a:fld id="{6D1BDCCC-1CBB-FA4E-9CF2-2901E22410E7}" type="datetimeFigureOut">
               <a:rPr lang="en-US" smtClean="0"/>
-              <a:t>10/16/24</a:t>
+              <a:t>10/25/24</a:t>
             </a:fld>
             <a:endParaRPr lang="en-US"/>
           </a:p>
@@ -2732,7 +2732,7 @@
           <a:p>
             <a:fld id="{6D1BDCCC-1CBB-FA4E-9CF2-2901E22410E7}" type="datetimeFigureOut">
               <a:rPr lang="en-US" smtClean="0"/>
-              <a:t>10/16/24</a:t>
+              <a:t>10/25/24</a:t>
             </a:fld>
             <a:endParaRPr lang="en-US"/>
           </a:p>
@@ -2845,7 +2845,7 @@
           <a:p>
             <a:fld id="{6D1BDCCC-1CBB-FA4E-9CF2-2901E22410E7}" type="datetimeFigureOut">
               <a:rPr lang="en-US" smtClean="0"/>
-              <a:t>10/16/24</a:t>
+              <a:t>10/25/24</a:t>
             </a:fld>
             <a:endParaRPr lang="en-US"/>
           </a:p>
@@ -3156,7 +3156,7 @@
           <a:p>
             <a:fld id="{6D1BDCCC-1CBB-FA4E-9CF2-2901E22410E7}" type="datetimeFigureOut">
               <a:rPr lang="en-US" smtClean="0"/>
-              <a:t>10/16/24</a:t>
+              <a:t>10/25/24</a:t>
             </a:fld>
             <a:endParaRPr lang="en-US"/>
           </a:p>
@@ -3444,7 +3444,7 @@
           <a:p>
             <a:fld id="{6D1BDCCC-1CBB-FA4E-9CF2-2901E22410E7}" type="datetimeFigureOut">
               <a:rPr lang="en-US" smtClean="0"/>
-              <a:t>10/16/24</a:t>
+              <a:t>10/25/24</a:t>
             </a:fld>
             <a:endParaRPr lang="en-US"/>
           </a:p>
@@ -3685,7 +3685,7 @@
           <a:p>
             <a:fld id="{6D1BDCCC-1CBB-FA4E-9CF2-2901E22410E7}" type="datetimeFigureOut">
               <a:rPr lang="en-US" smtClean="0"/>
-              <a:t>10/16/24</a:t>
+              <a:t>10/25/24</a:t>
             </a:fld>
             <a:endParaRPr lang="en-US"/>
           </a:p>
@@ -5758,8 +5758,8 @@
           </a:p>
         </p:txBody>
       </p:sp>
-      <mc:AlternateContent xmlns:mc="http://schemas.openxmlformats.org/markup-compatibility/2006">
-        <mc:Choice xmlns:a14="http://schemas.microsoft.com/office/drawing/2010/main" Requires="a14">
+      <mc:AlternateContent xmlns:mc="http://schemas.openxmlformats.org/markup-compatibility/2006" xmlns:a14="http://schemas.microsoft.com/office/drawing/2010/main">
+        <mc:Choice Requires="a14">
           <p:sp>
             <p:nvSpPr>
               <p:cNvPr id="3" name="Content Placeholder 2">
@@ -6236,7 +6236,7 @@
             </p:txBody>
           </p:sp>
         </mc:Choice>
-        <mc:Fallback>
+        <mc:Fallback xmlns="">
           <p:sp>
             <p:nvSpPr>
               <p:cNvPr id="3" name="Content Placeholder 2">
@@ -6338,8 +6338,8 @@
           </a:p>
         </p:txBody>
       </p:sp>
-      <mc:AlternateContent xmlns:mc="http://schemas.openxmlformats.org/markup-compatibility/2006">
-        <mc:Choice xmlns:a14="http://schemas.microsoft.com/office/drawing/2010/main" Requires="a14">
+      <mc:AlternateContent xmlns:mc="http://schemas.openxmlformats.org/markup-compatibility/2006" xmlns:a14="http://schemas.microsoft.com/office/drawing/2010/main">
+        <mc:Choice Requires="a14">
           <p:sp>
             <p:nvSpPr>
               <p:cNvPr id="3" name="Content Placeholder 2">
@@ -6805,7 +6805,7 @@
             </p:txBody>
           </p:sp>
         </mc:Choice>
-        <mc:Fallback>
+        <mc:Fallback xmlns="">
           <p:sp>
             <p:nvSpPr>
               <p:cNvPr id="3" name="Content Placeholder 2">
@@ -7785,8 +7785,8 @@
           </a:p>
         </p:txBody>
       </p:sp>
-      <mc:AlternateContent xmlns:mc="http://schemas.openxmlformats.org/markup-compatibility/2006">
-        <mc:Choice xmlns:a14="http://schemas.microsoft.com/office/drawing/2010/main" Requires="a14">
+      <mc:AlternateContent xmlns:mc="http://schemas.openxmlformats.org/markup-compatibility/2006" xmlns:a14="http://schemas.microsoft.com/office/drawing/2010/main">
+        <mc:Choice Requires="a14">
           <p:sp>
             <p:nvSpPr>
               <p:cNvPr id="3" name="Content Placeholder 2">
@@ -8176,7 +8176,7 @@
             </p:txBody>
           </p:sp>
         </mc:Choice>
-        <mc:Fallback>
+        <mc:Fallback xmlns="">
           <p:sp>
             <p:nvSpPr>
               <p:cNvPr id="3" name="Content Placeholder 2">
@@ -8335,8 +8335,8 @@
           </p:sp>
         </mc:Fallback>
       </mc:AlternateContent>
-      <mc:AlternateContent xmlns:mc="http://schemas.openxmlformats.org/markup-compatibility/2006">
-        <mc:Choice xmlns:a14="http://schemas.microsoft.com/office/drawing/2010/main" Requires="a14">
+      <mc:AlternateContent xmlns:mc="http://schemas.openxmlformats.org/markup-compatibility/2006" xmlns:a14="http://schemas.microsoft.com/office/drawing/2010/main">
+        <mc:Choice Requires="a14">
           <p:sp>
             <p:nvSpPr>
               <p:cNvPr id="6" name="Content Placeholder 2">
@@ -8891,7 +8891,7 @@
             </p:txBody>
           </p:sp>
         </mc:Choice>
-        <mc:Fallback>
+        <mc:Fallback xmlns="">
           <p:sp>
             <p:nvSpPr>
               <p:cNvPr id="6" name="Content Placeholder 2">
@@ -9000,8 +9000,8 @@
           </a:p>
         </p:txBody>
       </p:sp>
-      <mc:AlternateContent xmlns:mc="http://schemas.openxmlformats.org/markup-compatibility/2006">
-        <mc:Choice xmlns:a14="http://schemas.microsoft.com/office/drawing/2010/main" Requires="a14">
+      <mc:AlternateContent xmlns:mc="http://schemas.openxmlformats.org/markup-compatibility/2006" xmlns:a14="http://schemas.microsoft.com/office/drawing/2010/main">
+        <mc:Choice Requires="a14">
           <p:sp>
             <p:nvSpPr>
               <p:cNvPr id="3" name="Content Placeholder 2">
@@ -9466,7 +9466,7 @@
             </p:txBody>
           </p:sp>
         </mc:Choice>
-        <mc:Fallback>
+        <mc:Fallback xmlns="">
           <p:sp>
             <p:nvSpPr>
               <p:cNvPr id="3" name="Content Placeholder 2">
@@ -9625,8 +9625,8 @@
           </p:sp>
         </mc:Fallback>
       </mc:AlternateContent>
-      <mc:AlternateContent xmlns:mc="http://schemas.openxmlformats.org/markup-compatibility/2006">
-        <mc:Choice xmlns:a14="http://schemas.microsoft.com/office/drawing/2010/main" Requires="a14">
+      <mc:AlternateContent xmlns:mc="http://schemas.openxmlformats.org/markup-compatibility/2006" xmlns:a14="http://schemas.microsoft.com/office/drawing/2010/main">
+        <mc:Choice Requires="a14">
           <p:sp>
             <p:nvSpPr>
               <p:cNvPr id="6" name="Content Placeholder 2">
@@ -10266,7 +10266,7 @@
             </p:txBody>
           </p:sp>
         </mc:Choice>
-        <mc:Fallback>
+        <mc:Fallback xmlns="">
           <p:sp>
             <p:nvSpPr>
               <p:cNvPr id="6" name="Content Placeholder 2">
@@ -16865,12 +16865,31 @@
                             </a:rPr>
                             <m:t>𝜕</m:t>
                           </m:r>
-                          <m:r>
-                            <a:rPr lang="en-US" b="0" i="1" smtClean="0">
-                              <a:latin typeface="Cambria Math" panose="02040503050406030204" pitchFamily="18" charset="0"/>
-                            </a:rPr>
-                            <m:t>𝑍</m:t>
-                          </m:r>
+                          <m:sSup>
+                            <m:sSupPr>
+                              <m:ctrlPr>
+                                <a:rPr lang="en-US" b="0" i="1" smtClean="0">
+                                  <a:latin typeface="Cambria Math" panose="02040503050406030204" pitchFamily="18" charset="0"/>
+                                </a:rPr>
+                              </m:ctrlPr>
+                            </m:sSupPr>
+                            <m:e>
+                              <m:r>
+                                <a:rPr lang="en-US" b="0" i="1" smtClean="0">
+                                  <a:latin typeface="Cambria Math" panose="02040503050406030204" pitchFamily="18" charset="0"/>
+                                </a:rPr>
+                                <m:t>𝑍</m:t>
+                              </m:r>
+                            </m:e>
+                            <m:sup>
+                              <m:r>
+                                <a:rPr lang="en-US" b="0" i="1" smtClean="0">
+                                  <a:latin typeface="Cambria Math" panose="02040503050406030204" pitchFamily="18" charset="0"/>
+                                </a:rPr>
+                                <m:t>𝑝𝑟𝑖𝑚𝑎𝑙</m:t>
+                              </m:r>
+                            </m:sup>
+                          </m:sSup>
                         </m:num>
                         <m:den>
                           <m:r>
@@ -22335,8 +22354,8 @@
           </p:sp>
         </mc:Fallback>
       </mc:AlternateContent>
-      <mc:AlternateContent xmlns:mc="http://schemas.openxmlformats.org/markup-compatibility/2006">
-        <mc:Choice xmlns:a14="http://schemas.microsoft.com/office/drawing/2010/main" Requires="a14">
+      <mc:AlternateContent xmlns:mc="http://schemas.openxmlformats.org/markup-compatibility/2006" xmlns:a14="http://schemas.microsoft.com/office/drawing/2010/main">
+        <mc:Choice Requires="a14">
           <p:sp>
             <p:nvSpPr>
               <p:cNvPr id="6" name="Content Placeholder 2">
@@ -23814,13 +23833,7 @@
                         <a:rPr lang="en-US" sz="1800" b="0" i="1" smtClean="0">
                           <a:latin typeface="Cambria Math" panose="02040503050406030204" pitchFamily="18" charset="0"/>
                         </a:rPr>
-                        <m:t>         </m:t>
-                      </m:r>
-                      <m:r>
-                        <a:rPr lang="en-US" sz="1800" b="0" i="1" smtClean="0">
-                          <a:latin typeface="Cambria Math" panose="02040503050406030204" pitchFamily="18" charset="0"/>
-                        </a:rPr>
-                        <m:t>≥</m:t>
+                        <m:t>         ≥</m:t>
                       </m:r>
                       <m:sSubSup>
                         <m:sSubSupPr>
@@ -24032,7 +24045,7 @@
             </p:txBody>
           </p:sp>
         </mc:Choice>
-        <mc:Fallback>
+        <mc:Fallback xmlns="">
           <p:sp>
             <p:nvSpPr>
               <p:cNvPr id="6" name="Content Placeholder 2">

</xml_diff>